<commit_message>
Updated the instructions file
</commit_message>
<xml_diff>
--- a/project1/Instructions.pptx
+++ b/project1/Instructions.pptx
@@ -4169,6 +4169,57 @@
           </a:p>
         </p:txBody>
       </p:sp>
+      <p:sp>
+        <p:nvSpPr>
+          <p:cNvPr id="7" name="CasellaDiTesto 6">
+            <a:extLst>
+              <a:ext uri="{FF2B5EF4-FFF2-40B4-BE49-F238E27FC236}">
+                <a16:creationId xmlns:a16="http://schemas.microsoft.com/office/drawing/2014/main" id="{0219D0B5-ECFC-41D8-8679-8B849D731459}"/>
+              </a:ext>
+            </a:extLst>
+          </p:cNvPr>
+          <p:cNvSpPr txBox="1"/>
+          <p:nvPr/>
+        </p:nvSpPr>
+        <p:spPr>
+          <a:xfrm>
+            <a:off x="0" y="4551179"/>
+            <a:ext cx="1626635" cy="646331"/>
+          </a:xfrm>
+          <a:prstGeom prst="rect">
+            <a:avLst/>
+          </a:prstGeom>
+          <a:noFill/>
+        </p:spPr>
+        <p:txBody>
+          <a:bodyPr wrap="square" rtlCol="0">
+            <a:spAutoFit/>
+          </a:bodyPr>
+          <a:lstStyle/>
+          <a:p>
+            <a:pPr algn="ctr"/>
+            <a:r>
+              <a:rPr lang="it-IT" dirty="0">
+                <a:solidFill>
+                  <a:schemeClr val="bg1"/>
+                </a:solidFill>
+              </a:rPr>
+              <a:t>CHI: 1.76</a:t>
+            </a:r>
+          </a:p>
+          <a:p>
+            <a:pPr algn="ctr"/>
+            <a:r>
+              <a:rPr lang="it-IT" dirty="0">
+                <a:solidFill>
+                  <a:schemeClr val="bg1"/>
+                </a:solidFill>
+              </a:rPr>
+              <a:t>RATIO: 1:38.3</a:t>
+            </a:r>
+          </a:p>
+        </p:txBody>
+      </p:sp>
     </p:spTree>
     <p:extLst>
       <p:ext uri="{BB962C8B-B14F-4D97-AF65-F5344CB8AC3E}">
@@ -4694,6 +4745,57 @@
                 </a:solidFill>
               </a:rPr>
               <a:t>START</a:t>
+            </a:r>
+          </a:p>
+        </p:txBody>
+      </p:sp>
+      <p:sp>
+        <p:nvSpPr>
+          <p:cNvPr id="9" name="CasellaDiTesto 8">
+            <a:extLst>
+              <a:ext uri="{FF2B5EF4-FFF2-40B4-BE49-F238E27FC236}">
+                <a16:creationId xmlns:a16="http://schemas.microsoft.com/office/drawing/2014/main" id="{E3609846-D6F4-4642-A7FD-FB04491A3FDA}"/>
+              </a:ext>
+            </a:extLst>
+          </p:cNvPr>
+          <p:cNvSpPr txBox="1"/>
+          <p:nvPr/>
+        </p:nvSpPr>
+        <p:spPr>
+          <a:xfrm>
+            <a:off x="0" y="4791159"/>
+            <a:ext cx="1626635" cy="646331"/>
+          </a:xfrm>
+          <a:prstGeom prst="rect">
+            <a:avLst/>
+          </a:prstGeom>
+          <a:noFill/>
+        </p:spPr>
+        <p:txBody>
+          <a:bodyPr wrap="square" rtlCol="0">
+            <a:spAutoFit/>
+          </a:bodyPr>
+          <a:lstStyle/>
+          <a:p>
+            <a:pPr algn="ctr"/>
+            <a:r>
+              <a:rPr lang="it-IT" dirty="0">
+                <a:solidFill>
+                  <a:schemeClr val="bg1"/>
+                </a:solidFill>
+              </a:rPr>
+              <a:t>CHI: 1.75</a:t>
+            </a:r>
+          </a:p>
+          <a:p>
+            <a:pPr algn="ctr"/>
+            <a:r>
+              <a:rPr lang="it-IT" dirty="0">
+                <a:solidFill>
+                  <a:schemeClr val="bg1"/>
+                </a:solidFill>
+              </a:rPr>
+              <a:t>RATIO: 1:38.7</a:t>
             </a:r>
           </a:p>
         </p:txBody>
@@ -5138,6 +5240,57 @@
           </a:prstGeom>
         </p:spPr>
       </p:pic>
+      <p:sp>
+        <p:nvSpPr>
+          <p:cNvPr id="7" name="CasellaDiTesto 6">
+            <a:extLst>
+              <a:ext uri="{FF2B5EF4-FFF2-40B4-BE49-F238E27FC236}">
+                <a16:creationId xmlns:a16="http://schemas.microsoft.com/office/drawing/2014/main" id="{B360D6EF-B61F-438B-8E25-940D1535FEF9}"/>
+              </a:ext>
+            </a:extLst>
+          </p:cNvPr>
+          <p:cNvSpPr txBox="1"/>
+          <p:nvPr/>
+        </p:nvSpPr>
+        <p:spPr>
+          <a:xfrm>
+            <a:off x="0" y="4791159"/>
+            <a:ext cx="1626635" cy="646331"/>
+          </a:xfrm>
+          <a:prstGeom prst="rect">
+            <a:avLst/>
+          </a:prstGeom>
+          <a:noFill/>
+        </p:spPr>
+        <p:txBody>
+          <a:bodyPr wrap="square" rtlCol="0">
+            <a:spAutoFit/>
+          </a:bodyPr>
+          <a:lstStyle/>
+          <a:p>
+            <a:pPr algn="ctr"/>
+            <a:r>
+              <a:rPr lang="it-IT" dirty="0">
+                <a:solidFill>
+                  <a:schemeClr val="bg1"/>
+                </a:solidFill>
+              </a:rPr>
+              <a:t>CHI: 1.75</a:t>
+            </a:r>
+          </a:p>
+          <a:p>
+            <a:pPr algn="ctr"/>
+            <a:r>
+              <a:rPr lang="it-IT" dirty="0">
+                <a:solidFill>
+                  <a:schemeClr val="bg1"/>
+                </a:solidFill>
+              </a:rPr>
+              <a:t>RATIO: 1:38.7</a:t>
+            </a:r>
+          </a:p>
+        </p:txBody>
+      </p:sp>
     </p:spTree>
     <p:extLst>
       <p:ext uri="{BB962C8B-B14F-4D97-AF65-F5344CB8AC3E}">
@@ -5930,6 +6083,57 @@
                 </a:solidFill>
               </a:rPr>
               <a:t>START</a:t>
+            </a:r>
+          </a:p>
+        </p:txBody>
+      </p:sp>
+      <p:sp>
+        <p:nvSpPr>
+          <p:cNvPr id="11" name="CasellaDiTesto 10">
+            <a:extLst>
+              <a:ext uri="{FF2B5EF4-FFF2-40B4-BE49-F238E27FC236}">
+                <a16:creationId xmlns:a16="http://schemas.microsoft.com/office/drawing/2014/main" id="{8B4259BC-42EE-433E-8645-580C5F42B0DA}"/>
+              </a:ext>
+            </a:extLst>
+          </p:cNvPr>
+          <p:cNvSpPr txBox="1"/>
+          <p:nvPr/>
+        </p:nvSpPr>
+        <p:spPr>
+          <a:xfrm>
+            <a:off x="0" y="4867359"/>
+            <a:ext cx="1626635" cy="646331"/>
+          </a:xfrm>
+          <a:prstGeom prst="rect">
+            <a:avLst/>
+          </a:prstGeom>
+          <a:noFill/>
+        </p:spPr>
+        <p:txBody>
+          <a:bodyPr wrap="square" rtlCol="0">
+            <a:spAutoFit/>
+          </a:bodyPr>
+          <a:lstStyle/>
+          <a:p>
+            <a:pPr algn="ctr"/>
+            <a:r>
+              <a:rPr lang="it-IT" dirty="0">
+                <a:solidFill>
+                  <a:schemeClr val="bg1"/>
+                </a:solidFill>
+              </a:rPr>
+              <a:t>CHI: 1.75</a:t>
+            </a:r>
+          </a:p>
+          <a:p>
+            <a:pPr algn="ctr"/>
+            <a:r>
+              <a:rPr lang="it-IT" dirty="0">
+                <a:solidFill>
+                  <a:schemeClr val="bg1"/>
+                </a:solidFill>
+              </a:rPr>
+              <a:t>RATIO: 1:38.7</a:t>
             </a:r>
           </a:p>
         </p:txBody>
@@ -6487,6 +6691,57 @@
           </a:prstGeom>
         </p:spPr>
       </p:pic>
+      <p:sp>
+        <p:nvSpPr>
+          <p:cNvPr id="7" name="CasellaDiTesto 6">
+            <a:extLst>
+              <a:ext uri="{FF2B5EF4-FFF2-40B4-BE49-F238E27FC236}">
+                <a16:creationId xmlns:a16="http://schemas.microsoft.com/office/drawing/2014/main" id="{16B7218E-CADE-47B0-BD1F-0FEB45174518}"/>
+              </a:ext>
+            </a:extLst>
+          </p:cNvPr>
+          <p:cNvSpPr txBox="1"/>
+          <p:nvPr/>
+        </p:nvSpPr>
+        <p:spPr>
+          <a:xfrm>
+            <a:off x="0" y="4791159"/>
+            <a:ext cx="1626635" cy="646331"/>
+          </a:xfrm>
+          <a:prstGeom prst="rect">
+            <a:avLst/>
+          </a:prstGeom>
+          <a:noFill/>
+        </p:spPr>
+        <p:txBody>
+          <a:bodyPr wrap="square" rtlCol="0">
+            <a:spAutoFit/>
+          </a:bodyPr>
+          <a:lstStyle/>
+          <a:p>
+            <a:pPr algn="ctr"/>
+            <a:r>
+              <a:rPr lang="it-IT" dirty="0">
+                <a:solidFill>
+                  <a:schemeClr val="bg1"/>
+                </a:solidFill>
+              </a:rPr>
+              <a:t>CHI: 1.75</a:t>
+            </a:r>
+          </a:p>
+          <a:p>
+            <a:pPr algn="ctr"/>
+            <a:r>
+              <a:rPr lang="it-IT" dirty="0">
+                <a:solidFill>
+                  <a:schemeClr val="bg1"/>
+                </a:solidFill>
+              </a:rPr>
+              <a:t>RATIO: 1:38.7</a:t>
+            </a:r>
+          </a:p>
+        </p:txBody>
+      </p:sp>
     </p:spTree>
     <p:extLst>
       <p:ext uri="{BB962C8B-B14F-4D97-AF65-F5344CB8AC3E}">
@@ -7125,6 +7380,57 @@
                 </a:solidFill>
               </a:rPr>
               <a:t>START</a:t>
+            </a:r>
+          </a:p>
+        </p:txBody>
+      </p:sp>
+      <p:sp>
+        <p:nvSpPr>
+          <p:cNvPr id="15" name="CasellaDiTesto 14">
+            <a:extLst>
+              <a:ext uri="{FF2B5EF4-FFF2-40B4-BE49-F238E27FC236}">
+                <a16:creationId xmlns:a16="http://schemas.microsoft.com/office/drawing/2014/main" id="{98D94B53-3572-4350-8E1E-B217DBB49307}"/>
+              </a:ext>
+            </a:extLst>
+          </p:cNvPr>
+          <p:cNvSpPr txBox="1"/>
+          <p:nvPr/>
+        </p:nvSpPr>
+        <p:spPr>
+          <a:xfrm>
+            <a:off x="0" y="4791159"/>
+            <a:ext cx="1626635" cy="646331"/>
+          </a:xfrm>
+          <a:prstGeom prst="rect">
+            <a:avLst/>
+          </a:prstGeom>
+          <a:noFill/>
+        </p:spPr>
+        <p:txBody>
+          <a:bodyPr wrap="square" rtlCol="0">
+            <a:spAutoFit/>
+          </a:bodyPr>
+          <a:lstStyle/>
+          <a:p>
+            <a:pPr algn="ctr"/>
+            <a:r>
+              <a:rPr lang="it-IT" dirty="0">
+                <a:solidFill>
+                  <a:schemeClr val="bg1"/>
+                </a:solidFill>
+              </a:rPr>
+              <a:t>CHI: 1.64</a:t>
+            </a:r>
+          </a:p>
+          <a:p>
+            <a:pPr algn="ctr"/>
+            <a:r>
+              <a:rPr lang="it-IT" dirty="0">
+                <a:solidFill>
+                  <a:schemeClr val="bg1"/>
+                </a:solidFill>
+              </a:rPr>
+              <a:t>RATIO: 1:40</a:t>
             </a:r>
           </a:p>
         </p:txBody>
@@ -7749,6 +8055,57 @@
           </a:prstGeom>
         </p:spPr>
       </p:pic>
+      <p:sp>
+        <p:nvSpPr>
+          <p:cNvPr id="7" name="CasellaDiTesto 6">
+            <a:extLst>
+              <a:ext uri="{FF2B5EF4-FFF2-40B4-BE49-F238E27FC236}">
+                <a16:creationId xmlns:a16="http://schemas.microsoft.com/office/drawing/2014/main" id="{F5DC70F3-5097-4E9D-A4CD-D004EFD5FADE}"/>
+              </a:ext>
+            </a:extLst>
+          </p:cNvPr>
+          <p:cNvSpPr txBox="1"/>
+          <p:nvPr/>
+        </p:nvSpPr>
+        <p:spPr>
+          <a:xfrm>
+            <a:off x="0" y="4791159"/>
+            <a:ext cx="1626635" cy="646331"/>
+          </a:xfrm>
+          <a:prstGeom prst="rect">
+            <a:avLst/>
+          </a:prstGeom>
+          <a:noFill/>
+        </p:spPr>
+        <p:txBody>
+          <a:bodyPr wrap="square" rtlCol="0">
+            <a:spAutoFit/>
+          </a:bodyPr>
+          <a:lstStyle/>
+          <a:p>
+            <a:pPr algn="ctr"/>
+            <a:r>
+              <a:rPr lang="it-IT" dirty="0">
+                <a:solidFill>
+                  <a:schemeClr val="bg1"/>
+                </a:solidFill>
+              </a:rPr>
+              <a:t>CHI: 1.64</a:t>
+            </a:r>
+          </a:p>
+          <a:p>
+            <a:pPr algn="ctr"/>
+            <a:r>
+              <a:rPr lang="it-IT" dirty="0">
+                <a:solidFill>
+                  <a:schemeClr val="bg1"/>
+                </a:solidFill>
+              </a:rPr>
+              <a:t>RATIO: 1:40</a:t>
+            </a:r>
+          </a:p>
+        </p:txBody>
+      </p:sp>
     </p:spTree>
     <p:extLst>
       <p:ext uri="{BB962C8B-B14F-4D97-AF65-F5344CB8AC3E}">
@@ -8629,6 +8986,57 @@
                 </a:solidFill>
               </a:rPr>
               <a:t>START</a:t>
+            </a:r>
+          </a:p>
+        </p:txBody>
+      </p:sp>
+      <p:sp>
+        <p:nvSpPr>
+          <p:cNvPr id="11" name="CasellaDiTesto 10">
+            <a:extLst>
+              <a:ext uri="{FF2B5EF4-FFF2-40B4-BE49-F238E27FC236}">
+                <a16:creationId xmlns:a16="http://schemas.microsoft.com/office/drawing/2014/main" id="{74D82D58-23DD-4F82-B66D-E71B4E803008}"/>
+              </a:ext>
+            </a:extLst>
+          </p:cNvPr>
+          <p:cNvSpPr txBox="1"/>
+          <p:nvPr/>
+        </p:nvSpPr>
+        <p:spPr>
+          <a:xfrm>
+            <a:off x="0" y="4791159"/>
+            <a:ext cx="1626635" cy="646331"/>
+          </a:xfrm>
+          <a:prstGeom prst="rect">
+            <a:avLst/>
+          </a:prstGeom>
+          <a:noFill/>
+        </p:spPr>
+        <p:txBody>
+          <a:bodyPr wrap="square" rtlCol="0">
+            <a:spAutoFit/>
+          </a:bodyPr>
+          <a:lstStyle/>
+          <a:p>
+            <a:pPr algn="ctr"/>
+            <a:r>
+              <a:rPr lang="it-IT" dirty="0">
+                <a:solidFill>
+                  <a:schemeClr val="bg1"/>
+                </a:solidFill>
+              </a:rPr>
+              <a:t>CHI: 1.64</a:t>
+            </a:r>
+          </a:p>
+          <a:p>
+            <a:pPr algn="ctr"/>
+            <a:r>
+              <a:rPr lang="it-IT" dirty="0">
+                <a:solidFill>
+                  <a:schemeClr val="bg1"/>
+                </a:solidFill>
+              </a:rPr>
+              <a:t>RATIO: 1:40</a:t>
             </a:r>
           </a:p>
         </p:txBody>
@@ -9728,6 +10136,57 @@
           </a:prstGeom>
         </p:spPr>
       </p:pic>
+      <p:sp>
+        <p:nvSpPr>
+          <p:cNvPr id="7" name="CasellaDiTesto 6">
+            <a:extLst>
+              <a:ext uri="{FF2B5EF4-FFF2-40B4-BE49-F238E27FC236}">
+                <a16:creationId xmlns:a16="http://schemas.microsoft.com/office/drawing/2014/main" id="{701C3ADA-74AF-4593-8314-5EF021BBDA59}"/>
+              </a:ext>
+            </a:extLst>
+          </p:cNvPr>
+          <p:cNvSpPr txBox="1"/>
+          <p:nvPr/>
+        </p:nvSpPr>
+        <p:spPr>
+          <a:xfrm>
+            <a:off x="0" y="4791159"/>
+            <a:ext cx="1626635" cy="646331"/>
+          </a:xfrm>
+          <a:prstGeom prst="rect">
+            <a:avLst/>
+          </a:prstGeom>
+          <a:noFill/>
+        </p:spPr>
+        <p:txBody>
+          <a:bodyPr wrap="square" rtlCol="0">
+            <a:spAutoFit/>
+          </a:bodyPr>
+          <a:lstStyle/>
+          <a:p>
+            <a:pPr algn="ctr"/>
+            <a:r>
+              <a:rPr lang="it-IT" dirty="0">
+                <a:solidFill>
+                  <a:schemeClr val="bg1"/>
+                </a:solidFill>
+              </a:rPr>
+              <a:t>CHI: 1.64</a:t>
+            </a:r>
+          </a:p>
+          <a:p>
+            <a:pPr algn="ctr"/>
+            <a:r>
+              <a:rPr lang="it-IT" dirty="0">
+                <a:solidFill>
+                  <a:schemeClr val="bg1"/>
+                </a:solidFill>
+              </a:rPr>
+              <a:t>RATIO: 1:40</a:t>
+            </a:r>
+          </a:p>
+        </p:txBody>
+      </p:sp>
     </p:spTree>
     <p:extLst>
       <p:ext uri="{BB962C8B-B14F-4D97-AF65-F5344CB8AC3E}">
@@ -10118,6 +10577,57 @@
                 <a:schemeClr val="bg1"/>
               </a:solidFill>
             </a:endParaRPr>
+          </a:p>
+        </p:txBody>
+      </p:sp>
+      <p:sp>
+        <p:nvSpPr>
+          <p:cNvPr id="11" name="CasellaDiTesto 10">
+            <a:extLst>
+              <a:ext uri="{FF2B5EF4-FFF2-40B4-BE49-F238E27FC236}">
+                <a16:creationId xmlns:a16="http://schemas.microsoft.com/office/drawing/2014/main" id="{916D2B1D-A3C9-4E6D-ACA6-E83584AD6F6D}"/>
+              </a:ext>
+            </a:extLst>
+          </p:cNvPr>
+          <p:cNvSpPr txBox="1"/>
+          <p:nvPr/>
+        </p:nvSpPr>
+        <p:spPr>
+          <a:xfrm>
+            <a:off x="317977" y="5835618"/>
+            <a:ext cx="1626635" cy="646331"/>
+          </a:xfrm>
+          <a:prstGeom prst="rect">
+            <a:avLst/>
+          </a:prstGeom>
+          <a:noFill/>
+        </p:spPr>
+        <p:txBody>
+          <a:bodyPr wrap="square" rtlCol="0">
+            <a:spAutoFit/>
+          </a:bodyPr>
+          <a:lstStyle/>
+          <a:p>
+            <a:pPr algn="ctr"/>
+            <a:r>
+              <a:rPr lang="it-IT" dirty="0">
+                <a:solidFill>
+                  <a:schemeClr val="bg1"/>
+                </a:solidFill>
+              </a:rPr>
+              <a:t>CHI: 1.75</a:t>
+            </a:r>
+          </a:p>
+          <a:p>
+            <a:pPr algn="ctr"/>
+            <a:r>
+              <a:rPr lang="it-IT" dirty="0">
+                <a:solidFill>
+                  <a:schemeClr val="bg1"/>
+                </a:solidFill>
+              </a:rPr>
+              <a:t>RATIO: 1:38.7</a:t>
+            </a:r>
           </a:p>
         </p:txBody>
       </p:sp>
@@ -11034,6 +11544,57 @@
           </a:prstGeom>
         </p:spPr>
       </p:pic>
+      <p:sp>
+        <p:nvSpPr>
+          <p:cNvPr id="12" name="CasellaDiTesto 11">
+            <a:extLst>
+              <a:ext uri="{FF2B5EF4-FFF2-40B4-BE49-F238E27FC236}">
+                <a16:creationId xmlns:a16="http://schemas.microsoft.com/office/drawing/2014/main" id="{F1401F19-8DA1-4363-83D0-0C8257C5FFD0}"/>
+              </a:ext>
+            </a:extLst>
+          </p:cNvPr>
+          <p:cNvSpPr txBox="1"/>
+          <p:nvPr/>
+        </p:nvSpPr>
+        <p:spPr>
+          <a:xfrm>
+            <a:off x="317977" y="5835618"/>
+            <a:ext cx="1626635" cy="646331"/>
+          </a:xfrm>
+          <a:prstGeom prst="rect">
+            <a:avLst/>
+          </a:prstGeom>
+          <a:noFill/>
+        </p:spPr>
+        <p:txBody>
+          <a:bodyPr wrap="square" rtlCol="0">
+            <a:spAutoFit/>
+          </a:bodyPr>
+          <a:lstStyle/>
+          <a:p>
+            <a:pPr algn="ctr"/>
+            <a:r>
+              <a:rPr lang="it-IT" dirty="0">
+                <a:solidFill>
+                  <a:schemeClr val="bg1"/>
+                </a:solidFill>
+              </a:rPr>
+              <a:t>CHI: 1.75</a:t>
+            </a:r>
+          </a:p>
+          <a:p>
+            <a:pPr algn="ctr"/>
+            <a:r>
+              <a:rPr lang="it-IT" dirty="0">
+                <a:solidFill>
+                  <a:schemeClr val="bg1"/>
+                </a:solidFill>
+              </a:rPr>
+              <a:t>RATIO: 1:38.7</a:t>
+            </a:r>
+          </a:p>
+        </p:txBody>
+      </p:sp>
     </p:spTree>
     <p:extLst>
       <p:ext uri="{BB962C8B-B14F-4D97-AF65-F5344CB8AC3E}">
@@ -15839,6 +16400,57 @@
                 </a:solidFill>
               </a:rPr>
               <a:t>.</a:t>
+            </a:r>
+          </a:p>
+        </p:txBody>
+      </p:sp>
+      <p:sp>
+        <p:nvSpPr>
+          <p:cNvPr id="2" name="CasellaDiTesto 1">
+            <a:extLst>
+              <a:ext uri="{FF2B5EF4-FFF2-40B4-BE49-F238E27FC236}">
+                <a16:creationId xmlns:a16="http://schemas.microsoft.com/office/drawing/2014/main" id="{47F11C40-74A5-405A-BA69-E6C4CD5B5361}"/>
+              </a:ext>
+            </a:extLst>
+          </p:cNvPr>
+          <p:cNvSpPr txBox="1"/>
+          <p:nvPr/>
+        </p:nvSpPr>
+        <p:spPr>
+          <a:xfrm>
+            <a:off x="0" y="4792034"/>
+            <a:ext cx="1626635" cy="646331"/>
+          </a:xfrm>
+          <a:prstGeom prst="rect">
+            <a:avLst/>
+          </a:prstGeom>
+          <a:noFill/>
+        </p:spPr>
+        <p:txBody>
+          <a:bodyPr wrap="square" rtlCol="0">
+            <a:spAutoFit/>
+          </a:bodyPr>
+          <a:lstStyle/>
+          <a:p>
+            <a:pPr algn="ctr"/>
+            <a:r>
+              <a:rPr lang="it-IT" dirty="0">
+                <a:solidFill>
+                  <a:schemeClr val="bg1"/>
+                </a:solidFill>
+              </a:rPr>
+              <a:t>CHI: 1.76</a:t>
+            </a:r>
+          </a:p>
+          <a:p>
+            <a:pPr algn="ctr"/>
+            <a:r>
+              <a:rPr lang="it-IT" dirty="0">
+                <a:solidFill>
+                  <a:schemeClr val="bg1"/>
+                </a:solidFill>
+              </a:rPr>
+              <a:t>RATIO: 1:38.3</a:t>
             </a:r>
           </a:p>
         </p:txBody>

</xml_diff>